<commit_message>
spick fèr 231 geschrieben
</commit_message>
<xml_diff>
--- a/docs/M162/SideQuest 8B/162-8B-MatteoBosshard.pptx
+++ b/docs/M162/SideQuest 8B/162-8B-MatteoBosshard.pptx
@@ -1029,16 +1029,15 @@
             </a:r>
             <a:r>
               <a:rPr lang="de-DE" dirty="0"/>
-              <a:t>. Da eine Bestellung viele Produkte enthalten kann und ein Produkt in vielen Bestellungen vorkommt, habe ich diese N:M-Beziehung hier aufgelöst. Zudem sieht man, dass ein User mehrere Adressen haben kann, was</a:t>
-            </a:r>
-          </a:p>
-          <a:p>
-            <a:pPr marL="158750" indent="0">
-              <a:buNone/>
-            </a:pPr>
+              <a:t>. Da eine Bestellung viele Produkte enthalten kann und ein Produkt in vielen Bestellungen vorkommt, habe ich diese Many-</a:t>
+            </a:r>
+            <a:r>
+              <a:rPr lang="de-DE" dirty="0" err="1"/>
+              <a:t>to</a:t>
+            </a:r>
             <a:r>
               <a:rPr lang="de-DE" dirty="0"/>
-              <a:t>für getrennte Rechnungs- und Lieferanschriften essenziell ist</a:t>
+              <a:t>-Many-Beziehung hier aufgelöst. Zudem sieht man, dass ein User mehrere Adressen haben kann, was für getrennte Rechnungs- und Lieferanschriften essenziell ist</a:t>
             </a:r>
             <a:endParaRPr lang="de-CH" dirty="0"/>
           </a:p>
@@ -1169,7 +1168,7 @@
             </a:pPr>
             <a:r>
               <a:rPr lang="de-DE" dirty="0"/>
-              <a:t>Um Datenredundanz zu vermeiden, ist das Modell normalisiert. Technisch nutze ich Primärschlüssel mit Auto-</a:t>
+              <a:t>Um Datenredundanz zu vermeiden, ist das Modell bis und mit der 3. Normalform normalisiert. Technisch nutze ich Primärschlüssel mit Auto-</a:t>
             </a:r>
             <a:r>
               <a:rPr lang="de-DE" dirty="0" err="1"/>
@@ -1324,7 +1323,73 @@
             </a:r>
             <a:r>
               <a:rPr lang="de-DE" dirty="0"/>
-              <a:t>) ergibt sich logisch aus dem Preis des Produkts, der Menge in der Bestellungsposition und dem angewendeten Rabatt der gesamten Bestellung. Das verknüpft die Tabellen inhaltlich miteinander</a:t>
+              <a:t>) ergibt sich logisch aus dem Preis des Produkts, der Menge in der Bestellungsposition und dem angewendeten Rabatt der gesamten Bestellung. Das verknüpft die Tabellen inhaltlich miteinander. Ich </a:t>
+            </a:r>
+            <a:r>
+              <a:rPr lang="de-DE" dirty="0" err="1"/>
+              <a:t>weiss</a:t>
+            </a:r>
+            <a:r>
+              <a:rPr lang="de-DE" dirty="0"/>
+              <a:t>, dass das Feld </a:t>
+            </a:r>
+            <a:r>
+              <a:rPr lang="de-DE" dirty="0" err="1"/>
+              <a:t>amount_due</a:t>
+            </a:r>
+            <a:r>
+              <a:rPr lang="de-DE" dirty="0"/>
+              <a:t> rein theoretisch überflüssig ist, jedoch ist es in der Praxis Gang und Gäbe den finalen Preis ebenfalls speichert um 1. die Buchhaltung einfacher zu machen und 2. Stress von der Datenbank abnehmen, da man nicht </a:t>
+            </a:r>
+            <a:r>
+              <a:rPr lang="de-DE" dirty="0" err="1"/>
+              <a:t>Product</a:t>
+            </a:r>
+            <a:r>
+              <a:rPr lang="de-DE" dirty="0"/>
+              <a:t>, </a:t>
+            </a:r>
+            <a:r>
+              <a:rPr lang="de-DE" dirty="0" err="1"/>
+              <a:t>ProductOrder</a:t>
+            </a:r>
+            <a:r>
+              <a:rPr lang="de-DE" dirty="0"/>
+              <a:t> und Order abfragen muss.</a:t>
+            </a:r>
+          </a:p>
+          <a:p>
+            <a:pPr marL="0" lvl="0" indent="0" algn="l" rtl="0">
+              <a:spcBef>
+                <a:spcPts val="0"/>
+              </a:spcBef>
+              <a:spcAft>
+                <a:spcPts val="0"/>
+              </a:spcAft>
+              <a:buNone/>
+            </a:pPr>
+            <a:r>
+              <a:rPr lang="de-DE" dirty="0"/>
+              <a:t>---</a:t>
+            </a:r>
+          </a:p>
+          <a:p>
+            <a:pPr marL="0" lvl="0" indent="0" algn="l" rtl="0">
+              <a:spcBef>
+                <a:spcPts val="0"/>
+              </a:spcBef>
+              <a:spcAft>
+                <a:spcPts val="0"/>
+              </a:spcAft>
+              <a:buNone/>
+            </a:pPr>
+            <a:r>
+              <a:rPr lang="de-DE" dirty="0"/>
+              <a:t>Ebenfalls hilft es indem einen historischen Preis-Snapshot zu erstellen, da sich im Verlauf von Bestellung zu Heute die Preise </a:t>
+            </a:r>
+            <a:r>
+              <a:rPr lang="de-DE"/>
+              <a:t>ändern können.</a:t>
             </a:r>
             <a:endParaRPr dirty="0"/>
           </a:p>
@@ -1441,7 +1506,7 @@
             </a:r>
             <a:r>
               <a:rPr lang="de-DE" dirty="0"/>
-              <a:t> habe ich das Modell mit Testdaten geprüft. Die Daten zeigen, dass sowohl physische als auch digitale Produkte sowie verschiedene Zahlungsarten korrekt verarbeitet werden</a:t>
+              <a:t> habe ich das Modell mit Testdaten geprüft. Die Daten zeigen, dass sowohl physische als auch digitale Produkte sowie verschiedene Zahlungsarten korrekt verarbeitet werden.</a:t>
             </a:r>
             <a:endParaRPr dirty="0"/>
           </a:p>
@@ -6577,8 +6642,8 @@
         </p:nvSpPr>
         <p:spPr>
           <a:xfrm>
-            <a:off x="228750" y="228600"/>
-            <a:ext cx="3173926" cy="2325600"/>
+            <a:off x="228749" y="228600"/>
+            <a:ext cx="5469317" cy="2325600"/>
           </a:xfrm>
           <a:prstGeom prst="rect">
             <a:avLst/>
@@ -6601,7 +6666,7 @@
             </a:pPr>
             <a:r>
               <a:rPr lang="de-CH" noProof="0" dirty="0"/>
-              <a:t>Ausgangs-lage</a:t>
+              <a:t>Ausgangslage</a:t>
             </a:r>
           </a:p>
         </p:txBody>
@@ -6987,7 +7052,7 @@
         <p:spPr>
           <a:xfrm>
             <a:off x="228748" y="228600"/>
-            <a:ext cx="3929183" cy="1014375"/>
+            <a:ext cx="8500385" cy="1014375"/>
           </a:xfrm>
           <a:prstGeom prst="rect">
             <a:avLst/>
@@ -7010,13 +7075,8 @@
             </a:pPr>
             <a:r>
               <a:rPr lang="de-CH" noProof="0" dirty="0"/>
-              <a:t>Integrität &amp; Normalisier-</a:t>
-            </a:r>
-            <a:r>
-              <a:rPr lang="de-CH" noProof="0" dirty="0" err="1"/>
-              <a:t>ung</a:t>
-            </a:r>
-            <a:endParaRPr lang="de-CH" noProof="0" dirty="0"/>
+              <a:t>Integrität &amp; Normalisierung</a:t>
+            </a:r>
           </a:p>
         </p:txBody>
       </p:sp>
@@ -7321,7 +7381,7 @@
         <p:spPr>
           <a:xfrm>
             <a:off x="228749" y="228600"/>
-            <a:ext cx="3756656" cy="1014375"/>
+            <a:ext cx="6637718" cy="1014375"/>
           </a:xfrm>
           <a:prstGeom prst="rect">
             <a:avLst/>
@@ -7343,12 +7403,8 @@
               <a:buNone/>
             </a:pPr>
             <a:r>
-              <a:rPr lang="de-CH" noProof="0" dirty="0" err="1"/>
-              <a:t>Preisbe</a:t>
-            </a:r>
-            <a:r>
               <a:rPr lang="de-CH" noProof="0" dirty="0"/>
-              <a:t>-rechnung </a:t>
+              <a:t>Preisberechnung </a:t>
             </a:r>
           </a:p>
         </p:txBody>

</xml_diff>

<commit_message>
letzte sprechtext updates für 162-8B
</commit_message>
<xml_diff>
--- a/docs/M162/SideQuest 8B/162-8B-MatteoBosshard.pptx
+++ b/docs/M162/SideQuest 8B/162-8B-MatteoBosshard.pptx
@@ -816,6 +816,47 @@
               <a:rPr lang="de-DE" dirty="0"/>
               <a:t>Guten Tag zusammen. Ich habe mich mit der Modellierung einer relationalen Datenbank für einen Online-Shop beschäftigt und möchte euch heute mein Ergebnis vorstellen.</a:t>
             </a:r>
+          </a:p>
+          <a:p>
+            <a:pPr marL="0" lvl="0" indent="0" algn="l" rtl="0">
+              <a:spcBef>
+                <a:spcPts val="0"/>
+              </a:spcBef>
+              <a:spcAft>
+                <a:spcPts val="0"/>
+              </a:spcAft>
+              <a:buNone/>
+            </a:pPr>
+            <a:r>
+              <a:rPr lang="de-DE" dirty="0"/>
+              <a:t>---</a:t>
+            </a:r>
+          </a:p>
+          <a:p>
+            <a:pPr marL="0" lvl="0" indent="0" algn="l" rtl="0">
+              <a:spcBef>
+                <a:spcPts val="0"/>
+              </a:spcBef>
+              <a:spcAft>
+                <a:spcPts val="0"/>
+              </a:spcAft>
+              <a:buNone/>
+            </a:pPr>
+            <a:r>
+              <a:rPr lang="de-DE" dirty="0"/>
+              <a:t>Alle von euch haben schonmal etwas über einen E-Commerce Store gekauft, aber wisst ihr wie dies im Hintergrund wirklich aussieht? Deshalb habe ich mich mit der Modellierung einer relationalen Datenbank für einen Online-Shop beschäftigt und möchte euch heute mein Ergebnis vorstellen.</a:t>
+            </a:r>
+          </a:p>
+          <a:p>
+            <a:pPr marL="0" lvl="0" indent="0" algn="l" rtl="0">
+              <a:spcBef>
+                <a:spcPts val="0"/>
+              </a:spcBef>
+              <a:spcAft>
+                <a:spcPts val="0"/>
+              </a:spcAft>
+              <a:buNone/>
+            </a:pPr>
             <a:endParaRPr dirty="0"/>
           </a:p>
         </p:txBody>
@@ -1008,7 +1049,7 @@
           <a:bodyPr/>
           <a:lstStyle/>
           <a:p>
-            <a:pPr marL="158750" indent="0">
+            <a:pPr marL="158750" lvl="0" indent="0">
               <a:buNone/>
             </a:pPr>
             <a:r>
@@ -1168,7 +1209,7 @@
             </a:pPr>
             <a:r>
               <a:rPr lang="de-DE" dirty="0"/>
-              <a:t>Um Datenredundanz zu vermeiden, ist das Modell bis und mit der 3. Normalform normalisiert. Technisch nutze ich Primärschlüssel mit Auto-</a:t>
+              <a:t>Um Datenredundanz und Datenintegrität zu vermeiden, ist das Modell bis und mit der 3. Normalform normalisiert. Technisch nutze ich Primärschlüssel mit Auto-</a:t>
             </a:r>
             <a:r>
               <a:rPr lang="de-DE" dirty="0" err="1"/>
@@ -1307,7 +1348,7 @@
             </a:pPr>
             <a:r>
               <a:rPr lang="de-DE" dirty="0"/>
-              <a:t>Ein wichtiges Detail ist die Preisberechnung. Der fällige Betrag (</a:t>
+              <a:t>Ein wichtiges Detail für einen Online-Shop ist natürlich die Preisberechnung. Der fällige Betrag (</a:t>
             </a:r>
             <a:r>
               <a:rPr lang="de-DE" sz="1100" b="0" i="0" u="none" strike="noStrike" cap="none" dirty="0" err="1">
@@ -1385,11 +1426,7 @@
             </a:pPr>
             <a:r>
               <a:rPr lang="de-DE" dirty="0"/>
-              <a:t>Ebenfalls hilft es indem einen historischen Preis-Snapshot zu erstellen, da sich im Verlauf von Bestellung zu Heute die Preise </a:t>
-            </a:r>
-            <a:r>
-              <a:rPr lang="de-DE"/>
-              <a:t>ändern können.</a:t>
+              <a:t>Ebenfalls hilft es indem einen historischen Preis-Snapshot zu erstellen, da sich im Verlauf von Bestellung zu Heute die Preise ändern können.</a:t>
             </a:r>
             <a:endParaRPr dirty="0"/>
           </a:p>

</xml_diff>